<commit_message>
Improve EDA methodology: Use person-level data for individual characteristics analysis
- Fixed demographic analyses to use df_people instead of df_1
- Updated gender, age, race, and goal visualizations for methodological accuracy
- Ensures each individual is counted once in characteristic analyses
- Maintains event-level data (df_1) for match success analyses
- Fixed data path to correctly load from ../data/ directory
</commit_message>
<xml_diff>
--- a/Presentation_Project_Tinder_AH.pptx
+++ b/Presentation_Project_Tinder_AH.pptx
@@ -8581,8 +8581,8 @@
         </p:nvSpPr>
         <p:spPr>
           <a:xfrm>
-            <a:off x="820816" y="1293098"/>
-            <a:ext cx="7189328" cy="2679056"/>
+            <a:off x="463375" y="1417456"/>
+            <a:ext cx="7682601" cy="3082257"/>
           </a:xfrm>
           <a:prstGeom prst="rect">
             <a:avLst/>
@@ -8632,6 +8632,34 @@
             <a:r>
               <a:rPr lang="fr-FR" dirty="0"/>
               <a:t>Analyse exploratoire, descriptive et inférentielle de données</a:t>
+            </a:r>
+            <a:br>
+              <a:rPr lang="fr-FR" dirty="0"/>
+            </a:br>
+            <a:br>
+              <a:rPr lang="fr-FR" dirty="0"/>
+            </a:br>
+            <a:r>
+              <a:rPr lang="fr-FR" sz="2000" dirty="0"/>
+              <a:t>Lien vers le dépôt </a:t>
+            </a:r>
+            <a:r>
+              <a:rPr lang="fr-FR" sz="2000" dirty="0" err="1"/>
+              <a:t>Github</a:t>
+            </a:r>
+            <a:r>
+              <a:rPr lang="fr-FR" sz="2000" dirty="0"/>
+              <a:t>: </a:t>
+            </a:r>
+            <a:r>
+              <a:rPr lang="fr-FR" sz="2000" dirty="0">
+                <a:hlinkClick r:id="rId3"/>
+              </a:rPr>
+              <a:t>https://github.com/AgaHei/Speed_Dating_EDA</a:t>
+            </a:r>
+            <a:r>
+              <a:rPr lang="fr-FR" sz="2000" dirty="0"/>
+              <a:t> </a:t>
             </a:r>
             <a:br>
               <a:rPr lang="fr" sz="3600" dirty="0">
@@ -8707,7 +8735,7 @@
           <p:nvPr/>
         </p:nvPicPr>
         <p:blipFill>
-          <a:blip r:embed="rId3">
+          <a:blip r:embed="rId4">
             <a:alphaModFix/>
           </a:blip>
           <a:stretch>
@@ -8743,7 +8771,7 @@
           <p:nvPr/>
         </p:nvPicPr>
         <p:blipFill>
-          <a:blip r:embed="rId4">
+          <a:blip r:embed="rId5">
             <a:extLst>
               <a:ext uri="{28A0092B-C50C-407E-A947-70E740481C1C}">
                 <a14:useLocalDpi xmlns:a14="http://schemas.microsoft.com/office/drawing/2010/main" val="0"/>
@@ -8757,8 +8785,8 @@
         </p:blipFill>
         <p:spPr bwMode="auto">
           <a:xfrm>
-            <a:off x="5292716" y="2765146"/>
-            <a:ext cx="3719609" cy="2092280"/>
+            <a:off x="5392928" y="256032"/>
+            <a:ext cx="3524299" cy="1982418"/>
           </a:xfrm>
           <a:prstGeom prst="rect">
             <a:avLst/>

</xml_diff>